<commit_message>
Correct some stuff in presentation
</commit_message>
<xml_diff>
--- a/Presentation.pptx
+++ b/Presentation.pptx
@@ -6407,47 +6407,47 @@
     </dgm:pt>
   </dgm:ptLst>
   <dgm:cxnLst>
-    <dgm:cxn modelId="{09D63F2E-898E-41EF-AB01-916E5245B368}" srcId="{F0A258BF-D43A-4435-86D6-755ADF396415}" destId="{127A83D1-7771-4A1B-B963-4EAFA7A01F2E}" srcOrd="0" destOrd="0" parTransId="{1377C370-ECCF-40FF-A8A6-E390BDBC1C96}" sibTransId="{06C8FF11-AFEB-4047-B5BF-6C5A47CD24FF}"/>
+    <dgm:cxn modelId="{D8710376-8800-4E90-8C63-831ADFF0509A}" type="presOf" srcId="{127A83D1-7771-4A1B-B963-4EAFA7A01F2E}" destId="{9AEEC0E4-0528-4FDF-B967-404F58B6A73A}" srcOrd="1" destOrd="0" presId="urn:microsoft.com/office/officeart/2005/8/layout/hList9"/>
+    <dgm:cxn modelId="{6B7E6A16-4276-4DDC-BF48-802B2A2B95FD}" srcId="{1826CD8D-537B-4DE3-935A-20CADA9BFCA2}" destId="{84CAE4CA-692A-474D-9F6D-FA9F61E3739B}" srcOrd="5" destOrd="0" parTransId="{B90BBF37-8BC8-41E9-B2D4-2F2392479D1B}" sibTransId="{DA09D272-3F6F-403F-8450-EC99815A1378}"/>
+    <dgm:cxn modelId="{9E701383-D10E-4B6D-82F0-FF4F68496D0E}" type="presOf" srcId="{594CDCAE-BAE6-4BE5-9602-5653A8505E74}" destId="{0803ED27-C95A-4401-AECE-4E327A06FFE2}" srcOrd="0" destOrd="0" presId="urn:microsoft.com/office/officeart/2005/8/layout/hList9"/>
     <dgm:cxn modelId="{A9DF4D6B-7645-4F00-A06B-7D2DEDB2465C}" srcId="{00659510-6CEC-406E-85DB-9DDAF534A537}" destId="{F0A258BF-D43A-4435-86D6-755ADF396415}" srcOrd="1" destOrd="0" parTransId="{D9158937-044D-455D-8B37-74F54B300B7A}" sibTransId="{065423C6-86E7-4625-8549-BE08B2C5D73B}"/>
+    <dgm:cxn modelId="{3B312ED6-5880-4AA1-B8DF-BA4B55DF8A1D}" type="presOf" srcId="{84CAE4CA-692A-474D-9F6D-FA9F61E3739B}" destId="{B54D6A46-3D4A-4CC3-B1DD-EDD04DB4EE22}" srcOrd="0" destOrd="0" presId="urn:microsoft.com/office/officeart/2005/8/layout/hList9"/>
+    <dgm:cxn modelId="{64DD3986-EDDA-4AED-B334-E9F58A4DFFC6}" type="presOf" srcId="{D5503B8A-6484-4E7E-82CA-BCE9DEC04FA7}" destId="{71AB8FC0-3819-4C22-AF89-A19B47AB9B93}" srcOrd="1" destOrd="0" presId="urn:microsoft.com/office/officeart/2005/8/layout/hList9"/>
+    <dgm:cxn modelId="{F6D08D3D-797B-42A7-BB13-57F85837886D}" srcId="{F0A258BF-D43A-4435-86D6-755ADF396415}" destId="{8E839132-CEBF-4B16-A8F2-B980B0012C84}" srcOrd="1" destOrd="0" parTransId="{9311040B-347F-4F71-8069-A575AA85A082}" sibTransId="{EBD95E90-FFD2-4E86-9E28-53126443AAF1}"/>
+    <dgm:cxn modelId="{E55E367B-45D6-42AC-ADF7-4CB5EE4A7FCA}" type="presOf" srcId="{7A5A54FC-5304-44AC-92C3-0C0FC4A7A957}" destId="{2CF35C6B-D01A-4597-BB67-8A8A18C95E3E}" srcOrd="1" destOrd="0" presId="urn:microsoft.com/office/officeart/2005/8/layout/hList9"/>
+    <dgm:cxn modelId="{184D6448-99AC-4032-807F-054E84E29BD9}" type="presOf" srcId="{8E839132-CEBF-4B16-A8F2-B980B0012C84}" destId="{9B293562-AB0F-4CE5-AEF3-1875B222BBE6}" srcOrd="1" destOrd="0" presId="urn:microsoft.com/office/officeart/2005/8/layout/hList9"/>
+    <dgm:cxn modelId="{ABDBDC78-33C0-41CD-AB26-01D2482725AB}" type="presOf" srcId="{F0A258BF-D43A-4435-86D6-755ADF396415}" destId="{624E7E37-AC38-4F06-AE58-418D2F8A94F5}" srcOrd="0" destOrd="0" presId="urn:microsoft.com/office/officeart/2005/8/layout/hList9"/>
+    <dgm:cxn modelId="{F1CF97F2-3325-4182-A8A1-E7687F81C95E}" type="presOf" srcId="{78F957C6-308C-4A4A-AF0D-1857263CA556}" destId="{4B7A651D-EE1A-4ECD-A8A5-4D416B7BA243}" srcOrd="1" destOrd="0" presId="urn:microsoft.com/office/officeart/2005/8/layout/hList9"/>
     <dgm:cxn modelId="{A25A5B81-8C0B-4E5A-9BEA-1B60FD081A4D}" type="presOf" srcId="{D15216A3-03CC-4C4F-A220-50CE700056E6}" destId="{E9DEEF8F-1744-430E-BD9B-1C89E08AF446}" srcOrd="1" destOrd="0" presId="urn:microsoft.com/office/officeart/2005/8/layout/hList9"/>
-    <dgm:cxn modelId="{EA164340-3157-467F-99B5-1A1D665E70C2}" srcId="{1826CD8D-537B-4DE3-935A-20CADA9BFCA2}" destId="{D15216A3-03CC-4C4F-A220-50CE700056E6}" srcOrd="1" destOrd="0" parTransId="{F5700B0C-5C1D-4516-9994-CC51AC7015ED}" sibTransId="{69438DD9-8AC2-4E25-A05D-BAA6A83DB9CD}"/>
-    <dgm:cxn modelId="{ABDBDC78-33C0-41CD-AB26-01D2482725AB}" type="presOf" srcId="{F0A258BF-D43A-4435-86D6-755ADF396415}" destId="{624E7E37-AC38-4F06-AE58-418D2F8A94F5}" srcOrd="0" destOrd="0" presId="urn:microsoft.com/office/officeart/2005/8/layout/hList9"/>
-    <dgm:cxn modelId="{CE3A4712-16CA-4DC0-B0DE-B060B0966295}" type="presOf" srcId="{8E839132-CEBF-4B16-A8F2-B980B0012C84}" destId="{E3373B71-2224-4BB3-BF39-FBD1A265C849}" srcOrd="0" destOrd="0" presId="urn:microsoft.com/office/officeart/2005/8/layout/hList9"/>
+    <dgm:cxn modelId="{3F13449C-2145-4362-B692-1EC171DCC59B}" type="presOf" srcId="{84CAE4CA-692A-474D-9F6D-FA9F61E3739B}" destId="{D637D9EE-7252-43E7-AAD0-C3DA948E866C}" srcOrd="1" destOrd="0" presId="urn:microsoft.com/office/officeart/2005/8/layout/hList9"/>
+    <dgm:cxn modelId="{D3923E84-0427-4986-97EA-EACE7D07D2F8}" type="presOf" srcId="{ABA7FDEC-53C1-4C4D-BA88-2EDFD267C384}" destId="{D59F1AED-127C-436B-939A-9F84CA4B127F}" srcOrd="0" destOrd="0" presId="urn:microsoft.com/office/officeart/2005/8/layout/hList9"/>
+    <dgm:cxn modelId="{CF8FF5A4-1F51-400E-AEFA-CA30571F7F19}" type="presOf" srcId="{127A83D1-7771-4A1B-B963-4EAFA7A01F2E}" destId="{59261ABE-358C-4A0D-AA76-86FACED3EE03}" srcOrd="0" destOrd="0" presId="urn:microsoft.com/office/officeart/2005/8/layout/hList9"/>
+    <dgm:cxn modelId="{24999A4D-F2CD-4A96-A6C8-F38426D270BF}" type="presOf" srcId="{76AC9884-F620-4FEA-AFB5-723AE2547C8B}" destId="{F21966CD-6990-49D9-A2CF-1F7E61793856}" srcOrd="0" destOrd="0" presId="urn:microsoft.com/office/officeart/2005/8/layout/hList9"/>
+    <dgm:cxn modelId="{8F5D310A-7E77-47C9-8BC8-406C068A9799}" srcId="{1826CD8D-537B-4DE3-935A-20CADA9BFCA2}" destId="{594CDCAE-BAE6-4BE5-9602-5653A8505E74}" srcOrd="3" destOrd="0" parTransId="{6CF314A8-7497-4488-A573-857C70FEE1E6}" sibTransId="{E71C6B44-DAF0-4C1A-8066-1D2A89B0CA75}"/>
+    <dgm:cxn modelId="{AA4DA58E-3533-4964-AB51-335F26201C73}" type="presOf" srcId="{78F957C6-308C-4A4A-AF0D-1857263CA556}" destId="{76633228-2EBA-4C73-A6C6-D08C1797A993}" srcOrd="0" destOrd="0" presId="urn:microsoft.com/office/officeart/2005/8/layout/hList9"/>
+    <dgm:cxn modelId="{80EF2A7E-4C5E-443E-A4C1-3023F8D0FA5E}" type="presOf" srcId="{9C260A26-3884-4CEF-8E39-3F3459E9C198}" destId="{8A320095-7274-471E-8B14-100299798A9C}" srcOrd="0" destOrd="0" presId="urn:microsoft.com/office/officeart/2005/8/layout/hList9"/>
+    <dgm:cxn modelId="{BF7234E1-9F4B-4844-A94B-4EFC7554EC9F}" type="presOf" srcId="{594CDCAE-BAE6-4BE5-9602-5653A8505E74}" destId="{20F5F8DE-432A-4897-9F9A-84681EABC2D4}" srcOrd="1" destOrd="0" presId="urn:microsoft.com/office/officeart/2005/8/layout/hList9"/>
+    <dgm:cxn modelId="{A0BF7CE9-9406-4FD3-A465-5EAE45F098F7}" srcId="{00659510-6CEC-406E-85DB-9DDAF534A537}" destId="{1826CD8D-537B-4DE3-935A-20CADA9BFCA2}" srcOrd="0" destOrd="0" parTransId="{23CD60D6-3485-418F-A8D5-C89039F8FFC2}" sibTransId="{066AE521-F93C-41CA-BEAB-EE7D69087DF2}"/>
     <dgm:cxn modelId="{74707597-B73C-4EA7-A6C0-6BACA575A082}" type="presOf" srcId="{76AC9884-F620-4FEA-AFB5-723AE2547C8B}" destId="{8730891F-6A8A-4E72-87C6-47E24B9F4E3F}" srcOrd="1" destOrd="0" presId="urn:microsoft.com/office/officeart/2005/8/layout/hList9"/>
-    <dgm:cxn modelId="{6B7E6A16-4276-4DDC-BF48-802B2A2B95FD}" srcId="{1826CD8D-537B-4DE3-935A-20CADA9BFCA2}" destId="{84CAE4CA-692A-474D-9F6D-FA9F61E3739B}" srcOrd="5" destOrd="0" parTransId="{B90BBF37-8BC8-41E9-B2D4-2F2392479D1B}" sibTransId="{DA09D272-3F6F-403F-8450-EC99815A1378}"/>
-    <dgm:cxn modelId="{5390E46E-5A56-40C4-8178-6BE831BDEF5C}" type="presOf" srcId="{D5503B8A-6484-4E7E-82CA-BCE9DEC04FA7}" destId="{05112DBD-CA68-40D6-82E5-19417B8250C6}" srcOrd="0" destOrd="0" presId="urn:microsoft.com/office/officeart/2005/8/layout/hList9"/>
+    <dgm:cxn modelId="{99F298F9-9107-433A-9D23-0B9C98F78295}" srcId="{F0A258BF-D43A-4435-86D6-755ADF396415}" destId="{78F957C6-308C-4A4A-AF0D-1857263CA556}" srcOrd="4" destOrd="0" parTransId="{D0756D56-4205-4F2B-BA06-406E8727F705}" sibTransId="{B15BF769-C485-44B5-8B2D-BF9A9ECAA2B9}"/>
     <dgm:cxn modelId="{409A5C8F-16AA-4EF7-AC88-06D3BEE3F7B8}" srcId="{F0A258BF-D43A-4435-86D6-755ADF396415}" destId="{9C260A26-3884-4CEF-8E39-3F3459E9C198}" srcOrd="5" destOrd="0" parTransId="{E16331C5-F721-4CD8-95A0-DB0675E6EAE0}" sibTransId="{8BDFEB79-6433-4F83-BD0B-41C752E8EBBF}"/>
-    <dgm:cxn modelId="{64DD3986-EDDA-4AED-B334-E9F58A4DFFC6}" type="presOf" srcId="{D5503B8A-6484-4E7E-82CA-BCE9DEC04FA7}" destId="{71AB8FC0-3819-4C22-AF89-A19B47AB9B93}" srcOrd="1" destOrd="0" presId="urn:microsoft.com/office/officeart/2005/8/layout/hList9"/>
-    <dgm:cxn modelId="{889F8F2D-DB1C-4A9D-8B18-B9C2A399FD3A}" type="presOf" srcId="{00659510-6CEC-406E-85DB-9DDAF534A537}" destId="{0DFF4B07-E679-490C-82C7-51015E1CD8B1}" srcOrd="0" destOrd="0" presId="urn:microsoft.com/office/officeart/2005/8/layout/hList9"/>
-    <dgm:cxn modelId="{A0BF7CE9-9406-4FD3-A465-5EAE45F098F7}" srcId="{00659510-6CEC-406E-85DB-9DDAF534A537}" destId="{1826CD8D-537B-4DE3-935A-20CADA9BFCA2}" srcOrd="0" destOrd="0" parTransId="{23CD60D6-3485-418F-A8D5-C89039F8FFC2}" sibTransId="{066AE521-F93C-41CA-BEAB-EE7D69087DF2}"/>
     <dgm:cxn modelId="{91E4BB54-CD8C-4CCF-BFB3-419E1D763F30}" type="presOf" srcId="{ACDF78F5-3439-4961-AF90-690D031642C6}" destId="{FDE43C89-9AEC-4262-949C-734E00E12F05}" srcOrd="0" destOrd="0" presId="urn:microsoft.com/office/officeart/2005/8/layout/hList9"/>
-    <dgm:cxn modelId="{8201F67E-7A0D-44A6-8EA1-92611D79FD90}" srcId="{1826CD8D-537B-4DE3-935A-20CADA9BFCA2}" destId="{7A5A54FC-5304-44AC-92C3-0C0FC4A7A957}" srcOrd="4" destOrd="0" parTransId="{CD8C1402-4FCD-41A1-8717-6902A8C51C5C}" sibTransId="{9EED2464-2696-48E8-B82F-4FEDF8835E29}"/>
-    <dgm:cxn modelId="{C57BF39D-AFA3-4824-A9D8-E044119CB693}" srcId="{F0A258BF-D43A-4435-86D6-755ADF396415}" destId="{D5503B8A-6484-4E7E-82CA-BCE9DEC04FA7}" srcOrd="3" destOrd="0" parTransId="{3191F2D0-2702-46D7-AA7A-871E009C0670}" sibTransId="{196514CB-CC1C-4F30-A701-2349C43BA2A7}"/>
-    <dgm:cxn modelId="{F6D08D3D-797B-42A7-BB13-57F85837886D}" srcId="{F0A258BF-D43A-4435-86D6-755ADF396415}" destId="{8E839132-CEBF-4B16-A8F2-B980B0012C84}" srcOrd="1" destOrd="0" parTransId="{9311040B-347F-4F71-8069-A575AA85A082}" sibTransId="{EBD95E90-FFD2-4E86-9E28-53126443AAF1}"/>
-    <dgm:cxn modelId="{D3923E84-0427-4986-97EA-EACE7D07D2F8}" type="presOf" srcId="{ABA7FDEC-53C1-4C4D-BA88-2EDFD267C384}" destId="{D59F1AED-127C-436B-939A-9F84CA4B127F}" srcOrd="0" destOrd="0" presId="urn:microsoft.com/office/officeart/2005/8/layout/hList9"/>
     <dgm:cxn modelId="{92F61E86-44C6-4F60-8973-B74B8A61D505}" type="presOf" srcId="{ACDF78F5-3439-4961-AF90-690D031642C6}" destId="{367C0A8F-9400-4D09-8C78-94E51B9F8A93}" srcOrd="1" destOrd="0" presId="urn:microsoft.com/office/officeart/2005/8/layout/hList9"/>
     <dgm:cxn modelId="{FA2999C5-43DD-440E-ACA4-40396A94A791}" type="presOf" srcId="{1826CD8D-537B-4DE3-935A-20CADA9BFCA2}" destId="{103BE875-1AEC-4EF9-8F03-E99503FA09B0}" srcOrd="0" destOrd="0" presId="urn:microsoft.com/office/officeart/2005/8/layout/hList9"/>
-    <dgm:cxn modelId="{9E701383-D10E-4B6D-82F0-FF4F68496D0E}" type="presOf" srcId="{594CDCAE-BAE6-4BE5-9602-5653A8505E74}" destId="{0803ED27-C95A-4401-AECE-4E327A06FFE2}" srcOrd="0" destOrd="0" presId="urn:microsoft.com/office/officeart/2005/8/layout/hList9"/>
+    <dgm:cxn modelId="{5390E46E-5A56-40C4-8178-6BE831BDEF5C}" type="presOf" srcId="{D5503B8A-6484-4E7E-82CA-BCE9DEC04FA7}" destId="{05112DBD-CA68-40D6-82E5-19417B8250C6}" srcOrd="0" destOrd="0" presId="urn:microsoft.com/office/officeart/2005/8/layout/hList9"/>
+    <dgm:cxn modelId="{C57BF39D-AFA3-4824-A9D8-E044119CB693}" srcId="{F0A258BF-D43A-4435-86D6-755ADF396415}" destId="{D5503B8A-6484-4E7E-82CA-BCE9DEC04FA7}" srcOrd="3" destOrd="0" parTransId="{3191F2D0-2702-46D7-AA7A-871E009C0670}" sibTransId="{196514CB-CC1C-4F30-A701-2349C43BA2A7}"/>
     <dgm:cxn modelId="{EFC03F25-8D50-4B78-96DE-B1C1E4FD3BE9}" type="presOf" srcId="{D15216A3-03CC-4C4F-A220-50CE700056E6}" destId="{05B6FA51-0CC4-42C0-AC39-E98D5CEDDD34}" srcOrd="0" destOrd="0" presId="urn:microsoft.com/office/officeart/2005/8/layout/hList9"/>
-    <dgm:cxn modelId="{D8710376-8800-4E90-8C63-831ADFF0509A}" type="presOf" srcId="{127A83D1-7771-4A1B-B963-4EAFA7A01F2E}" destId="{9AEEC0E4-0528-4FDF-B967-404F58B6A73A}" srcOrd="1" destOrd="0" presId="urn:microsoft.com/office/officeart/2005/8/layout/hList9"/>
-    <dgm:cxn modelId="{99F298F9-9107-433A-9D23-0B9C98F78295}" srcId="{F0A258BF-D43A-4435-86D6-755ADF396415}" destId="{78F957C6-308C-4A4A-AF0D-1857263CA556}" srcOrd="4" destOrd="0" parTransId="{D0756D56-4205-4F2B-BA06-406E8727F705}" sibTransId="{B15BF769-C485-44B5-8B2D-BF9A9ECAA2B9}"/>
     <dgm:cxn modelId="{7C7B8047-D63A-445C-9DC0-59A1EFA06053}" type="presOf" srcId="{ABA7FDEC-53C1-4C4D-BA88-2EDFD267C384}" destId="{1D3224AC-0CF7-4406-8C99-F96BE2EF645D}" srcOrd="1" destOrd="0" presId="urn:microsoft.com/office/officeart/2005/8/layout/hList9"/>
-    <dgm:cxn modelId="{CF8FF5A4-1F51-400E-AEFA-CA30571F7F19}" type="presOf" srcId="{127A83D1-7771-4A1B-B963-4EAFA7A01F2E}" destId="{59261ABE-358C-4A0D-AA76-86FACED3EE03}" srcOrd="0" destOrd="0" presId="urn:microsoft.com/office/officeart/2005/8/layout/hList9"/>
-    <dgm:cxn modelId="{879C56C4-67FD-46B5-9F2E-17C75235EB1D}" srcId="{1826CD8D-537B-4DE3-935A-20CADA9BFCA2}" destId="{ABA7FDEC-53C1-4C4D-BA88-2EDFD267C384}" srcOrd="0" destOrd="0" parTransId="{D34F06EB-77C9-4FC7-85AC-3FC8445DD332}" sibTransId="{02C56843-E85B-42AA-BDBA-C35EC9BE401B}"/>
-    <dgm:cxn modelId="{3B312ED6-5880-4AA1-B8DF-BA4B55DF8A1D}" type="presOf" srcId="{84CAE4CA-692A-474D-9F6D-FA9F61E3739B}" destId="{B54D6A46-3D4A-4CC3-B1DD-EDD04DB4EE22}" srcOrd="0" destOrd="0" presId="urn:microsoft.com/office/officeart/2005/8/layout/hList9"/>
-    <dgm:cxn modelId="{F916167C-8A34-41F7-B59B-A0F08ADA85AB}" srcId="{1826CD8D-537B-4DE3-935A-20CADA9BFCA2}" destId="{ACDF78F5-3439-4961-AF90-690D031642C6}" srcOrd="2" destOrd="0" parTransId="{CD721BD4-35D1-487E-B200-5AC64D1223EC}" sibTransId="{E4252B19-831C-4267-971F-1822C548387F}"/>
-    <dgm:cxn modelId="{AA4DA58E-3533-4964-AB51-335F26201C73}" type="presOf" srcId="{78F957C6-308C-4A4A-AF0D-1857263CA556}" destId="{76633228-2EBA-4C73-A6C6-D08C1797A993}" srcOrd="0" destOrd="0" presId="urn:microsoft.com/office/officeart/2005/8/layout/hList9"/>
-    <dgm:cxn modelId="{3F13449C-2145-4362-B692-1EC171DCC59B}" type="presOf" srcId="{84CAE4CA-692A-474D-9F6D-FA9F61E3739B}" destId="{D637D9EE-7252-43E7-AAD0-C3DA948E866C}" srcOrd="1" destOrd="0" presId="urn:microsoft.com/office/officeart/2005/8/layout/hList9"/>
-    <dgm:cxn modelId="{80EF2A7E-4C5E-443E-A4C1-3023F8D0FA5E}" type="presOf" srcId="{9C260A26-3884-4CEF-8E39-3F3459E9C198}" destId="{8A320095-7274-471E-8B14-100299798A9C}" srcOrd="0" destOrd="0" presId="urn:microsoft.com/office/officeart/2005/8/layout/hList9"/>
-    <dgm:cxn modelId="{E55E367B-45D6-42AC-ADF7-4CB5EE4A7FCA}" type="presOf" srcId="{7A5A54FC-5304-44AC-92C3-0C0FC4A7A957}" destId="{2CF35C6B-D01A-4597-BB67-8A8A18C95E3E}" srcOrd="1" destOrd="0" presId="urn:microsoft.com/office/officeart/2005/8/layout/hList9"/>
-    <dgm:cxn modelId="{24999A4D-F2CD-4A96-A6C8-F38426D270BF}" type="presOf" srcId="{76AC9884-F620-4FEA-AFB5-723AE2547C8B}" destId="{F21966CD-6990-49D9-A2CF-1F7E61793856}" srcOrd="0" destOrd="0" presId="urn:microsoft.com/office/officeart/2005/8/layout/hList9"/>
-    <dgm:cxn modelId="{BF7234E1-9F4B-4844-A94B-4EFC7554EC9F}" type="presOf" srcId="{594CDCAE-BAE6-4BE5-9602-5653A8505E74}" destId="{20F5F8DE-432A-4897-9F9A-84681EABC2D4}" srcOrd="1" destOrd="0" presId="urn:microsoft.com/office/officeart/2005/8/layout/hList9"/>
-    <dgm:cxn modelId="{8F5D310A-7E77-47C9-8BC8-406C068A9799}" srcId="{1826CD8D-537B-4DE3-935A-20CADA9BFCA2}" destId="{594CDCAE-BAE6-4BE5-9602-5653A8505E74}" srcOrd="3" destOrd="0" parTransId="{6CF314A8-7497-4488-A573-857C70FEE1E6}" sibTransId="{E71C6B44-DAF0-4C1A-8066-1D2A89B0CA75}"/>
+    <dgm:cxn modelId="{8201F67E-7A0D-44A6-8EA1-92611D79FD90}" srcId="{1826CD8D-537B-4DE3-935A-20CADA9BFCA2}" destId="{7A5A54FC-5304-44AC-92C3-0C0FC4A7A957}" srcOrd="4" destOrd="0" parTransId="{CD8C1402-4FCD-41A1-8717-6902A8C51C5C}" sibTransId="{9EED2464-2696-48E8-B82F-4FEDF8835E29}"/>
+    <dgm:cxn modelId="{889F8F2D-DB1C-4A9D-8B18-B9C2A399FD3A}" type="presOf" srcId="{00659510-6CEC-406E-85DB-9DDAF534A537}" destId="{0DFF4B07-E679-490C-82C7-51015E1CD8B1}" srcOrd="0" destOrd="0" presId="urn:microsoft.com/office/officeart/2005/8/layout/hList9"/>
     <dgm:cxn modelId="{81D30DE0-37C4-486B-8D3C-07D462262F8F}" type="presOf" srcId="{7A5A54FC-5304-44AC-92C3-0C0FC4A7A957}" destId="{51891A00-983D-4BF4-A8E7-586016D2A1CE}" srcOrd="0" destOrd="0" presId="urn:microsoft.com/office/officeart/2005/8/layout/hList9"/>
     <dgm:cxn modelId="{9FAACC4D-7E69-4463-B6AB-765B2DD76F3E}" type="presOf" srcId="{9C260A26-3884-4CEF-8E39-3F3459E9C198}" destId="{02BC7910-3E58-4257-89B2-F1377E4C6265}" srcOrd="1" destOrd="0" presId="urn:microsoft.com/office/officeart/2005/8/layout/hList9"/>
-    <dgm:cxn modelId="{F1CF97F2-3325-4182-A8A1-E7687F81C95E}" type="presOf" srcId="{78F957C6-308C-4A4A-AF0D-1857263CA556}" destId="{4B7A651D-EE1A-4ECD-A8A5-4D416B7BA243}" srcOrd="1" destOrd="0" presId="urn:microsoft.com/office/officeart/2005/8/layout/hList9"/>
-    <dgm:cxn modelId="{184D6448-99AC-4032-807F-054E84E29BD9}" type="presOf" srcId="{8E839132-CEBF-4B16-A8F2-B980B0012C84}" destId="{9B293562-AB0F-4CE5-AEF3-1875B222BBE6}" srcOrd="1" destOrd="0" presId="urn:microsoft.com/office/officeart/2005/8/layout/hList9"/>
+    <dgm:cxn modelId="{EA164340-3157-467F-99B5-1A1D665E70C2}" srcId="{1826CD8D-537B-4DE3-935A-20CADA9BFCA2}" destId="{D15216A3-03CC-4C4F-A220-50CE700056E6}" srcOrd="1" destOrd="0" parTransId="{F5700B0C-5C1D-4516-9994-CC51AC7015ED}" sibTransId="{69438DD9-8AC2-4E25-A05D-BAA6A83DB9CD}"/>
     <dgm:cxn modelId="{C0CFBD75-7176-4EA9-9A17-7EC0C5A25291}" srcId="{F0A258BF-D43A-4435-86D6-755ADF396415}" destId="{76AC9884-F620-4FEA-AFB5-723AE2547C8B}" srcOrd="2" destOrd="0" parTransId="{E888F814-DC30-41BE-9826-754C987B7D56}" sibTransId="{93C4429F-064B-4496-9526-411BA6F30D25}"/>
+    <dgm:cxn modelId="{09D63F2E-898E-41EF-AB01-916E5245B368}" srcId="{F0A258BF-D43A-4435-86D6-755ADF396415}" destId="{127A83D1-7771-4A1B-B963-4EAFA7A01F2E}" srcOrd="0" destOrd="0" parTransId="{1377C370-ECCF-40FF-A8A6-E390BDBC1C96}" sibTransId="{06C8FF11-AFEB-4047-B5BF-6C5A47CD24FF}"/>
+    <dgm:cxn modelId="{F916167C-8A34-41F7-B59B-A0F08ADA85AB}" srcId="{1826CD8D-537B-4DE3-935A-20CADA9BFCA2}" destId="{ACDF78F5-3439-4961-AF90-690D031642C6}" srcOrd="2" destOrd="0" parTransId="{CD721BD4-35D1-487E-B200-5AC64D1223EC}" sibTransId="{E4252B19-831C-4267-971F-1822C548387F}"/>
+    <dgm:cxn modelId="{879C56C4-67FD-46B5-9F2E-17C75235EB1D}" srcId="{1826CD8D-537B-4DE3-935A-20CADA9BFCA2}" destId="{ABA7FDEC-53C1-4C4D-BA88-2EDFD267C384}" srcOrd="0" destOrd="0" parTransId="{D34F06EB-77C9-4FC7-85AC-3FC8445DD332}" sibTransId="{02C56843-E85B-42AA-BDBA-C35EC9BE401B}"/>
+    <dgm:cxn modelId="{CE3A4712-16CA-4DC0-B0DE-B060B0966295}" type="presOf" srcId="{8E839132-CEBF-4B16-A8F2-B980B0012C84}" destId="{E3373B71-2224-4BB3-BF39-FBD1A265C849}" srcOrd="0" destOrd="0" presId="urn:microsoft.com/office/officeart/2005/8/layout/hList9"/>
     <dgm:cxn modelId="{544192A0-0CAF-4C03-9774-67F4A8620ADF}" type="presParOf" srcId="{0DFF4B07-E679-490C-82C7-51015E1CD8B1}" destId="{2BC6901A-E202-4484-A491-DFB2D298AC4A}" srcOrd="0" destOrd="0" presId="urn:microsoft.com/office/officeart/2005/8/layout/hList9"/>
     <dgm:cxn modelId="{8DE0C191-B665-4D2E-B2A6-C81EEFC74A33}" type="presParOf" srcId="{0DFF4B07-E679-490C-82C7-51015E1CD8B1}" destId="{EC697B0A-E136-4653-AA5F-163903A9360E}" srcOrd="1" destOrd="0" presId="urn:microsoft.com/office/officeart/2005/8/layout/hList9"/>
     <dgm:cxn modelId="{643DC2B1-8877-4E10-B7A2-E250DA520437}" type="presParOf" srcId="{EC697B0A-E136-4653-AA5F-163903A9360E}" destId="{9B49CFDA-9B2A-49FC-81AD-5760B87BCA0D}" srcOrd="0" destOrd="0" presId="urn:microsoft.com/office/officeart/2005/8/layout/hList9"/>
@@ -35636,8 +35636,8 @@
         </p:nvSpPr>
         <p:spPr>
           <a:xfrm>
-            <a:off x="1097280" y="2526030"/>
-            <a:ext cx="10161270" cy="3416320"/>
+            <a:off x="1097279" y="2526030"/>
+            <a:ext cx="10395637" cy="3416320"/>
           </a:xfrm>
           <a:prstGeom prst="rect">
             <a:avLst/>
@@ -35774,6 +35774,51 @@
                 <a:latin typeface="Consolas" panose="020B0609020204030204" pitchFamily="49" charset="0"/>
               </a:rPr>
               <a:t>p_puissance</a:t>
+            </a:r>
+            <a:r>
+              <a:rPr lang="fr-CA" dirty="0">
+                <a:solidFill>
+                  <a:srgbClr val="859900"/>
+                </a:solidFill>
+                <a:latin typeface="Consolas" panose="020B0609020204030204" pitchFamily="49" charset="0"/>
+              </a:rPr>
+              <a:t>)</a:t>
+            </a:r>
+            <a:r>
+              <a:rPr lang="fr-CA" dirty="0">
+                <a:solidFill>
+                  <a:srgbClr val="819090"/>
+                </a:solidFill>
+                <a:latin typeface="Consolas" panose="020B0609020204030204" pitchFamily="49" charset="0"/>
+              </a:rPr>
+              <a:t>, </a:t>
+            </a:r>
+            <a:r>
+              <a:rPr lang="fr-CA" dirty="0" err="1">
+                <a:solidFill>
+                  <a:srgbClr val="819090"/>
+                </a:solidFill>
+                <a:latin typeface="Consolas" panose="020B0609020204030204" pitchFamily="49" charset="0"/>
+              </a:rPr>
+              <a:t>m_monPlat</a:t>
+            </a:r>
+            <a:r>
+              <a:rPr lang="fr-CA" dirty="0">
+                <a:solidFill>
+                  <a:srgbClr val="859900"/>
+                </a:solidFill>
+                <a:latin typeface="Consolas" panose="020B0609020204030204" pitchFamily="49" charset="0"/>
+              </a:rPr>
+              <a:t>(</a:t>
+            </a:r>
+            <a:r>
+              <a:rPr lang="fr-CA" dirty="0">
+                <a:solidFill>
+                  <a:srgbClr val="D11C24"/>
+                </a:solidFill>
+                <a:latin typeface="Consolas" panose="020B0609020204030204" pitchFamily="49" charset="0"/>
+              </a:rPr>
+              <a:t>NULL</a:t>
             </a:r>
             <a:r>
               <a:rPr lang="fr-CA" dirty="0">
@@ -37498,7 +37543,7 @@
         <p:spPr>
           <a:xfrm>
             <a:off x="1097280" y="1913096"/>
-            <a:ext cx="8564880" cy="4247317"/>
+            <a:ext cx="8564880" cy="3416320"/>
           </a:xfrm>
           <a:prstGeom prst="rect">
             <a:avLst/>
@@ -38050,13 +38095,31 @@
           </a:p>
           <a:p>
             <a:r>
-              <a:rPr lang="fr-CA" dirty="0">
+              <a:rPr lang="fr-CA" dirty="0" err="1">
                 <a:solidFill>
                   <a:srgbClr val="D11C24"/>
                 </a:solidFill>
                 <a:latin typeface="Consolas" panose="020B0609020204030204" pitchFamily="49" charset="0"/>
               </a:rPr>
-              <a:t>if</a:t>
+              <a:t>delete</a:t>
+            </a:r>
+            <a:r>
+              <a:rPr lang="fr-CA" dirty="0">
+                <a:solidFill>
+                  <a:srgbClr val="819090"/>
+                </a:solidFill>
+                <a:latin typeface="Consolas" panose="020B0609020204030204" pitchFamily="49" charset="0"/>
+              </a:rPr>
+              <a:t> plat2</a:t>
+            </a:r>
+            <a:r>
+              <a:rPr lang="fr-CA" dirty="0">
+                <a:solidFill>
+                  <a:srgbClr val="859900"/>
+                </a:solidFill>
+                <a:latin typeface="Consolas" panose="020B0609020204030204" pitchFamily="49" charset="0"/>
+              </a:rPr>
+              <a:t>;</a:t>
             </a:r>
             <a:r>
               <a:rPr lang="fr-CA" dirty="0">
@@ -38066,147 +38129,6 @@
                 <a:latin typeface="Consolas" panose="020B0609020204030204" pitchFamily="49" charset="0"/>
               </a:rPr>
               <a:t> </a:t>
-            </a:r>
-            <a:r>
-              <a:rPr lang="fr-CA" dirty="0">
-                <a:solidFill>
-                  <a:srgbClr val="859900"/>
-                </a:solidFill>
-                <a:latin typeface="Consolas" panose="020B0609020204030204" pitchFamily="49" charset="0"/>
-              </a:rPr>
-              <a:t>(</a:t>
-            </a:r>
-            <a:r>
-              <a:rPr lang="fr-CA" dirty="0">
-                <a:solidFill>
-                  <a:srgbClr val="819090"/>
-                </a:solidFill>
-                <a:latin typeface="Consolas" panose="020B0609020204030204" pitchFamily="49" charset="0"/>
-              </a:rPr>
-              <a:t>plat2 </a:t>
-            </a:r>
-            <a:r>
-              <a:rPr lang="fr-CA" dirty="0">
-                <a:solidFill>
-                  <a:srgbClr val="859900"/>
-                </a:solidFill>
-                <a:latin typeface="Consolas" panose="020B0609020204030204" pitchFamily="49" charset="0"/>
-              </a:rPr>
-              <a:t>!=</a:t>
-            </a:r>
-            <a:r>
-              <a:rPr lang="fr-CA" dirty="0">
-                <a:solidFill>
-                  <a:srgbClr val="819090"/>
-                </a:solidFill>
-                <a:latin typeface="Consolas" panose="020B0609020204030204" pitchFamily="49" charset="0"/>
-              </a:rPr>
-              <a:t> </a:t>
-            </a:r>
-            <a:r>
-              <a:rPr lang="fr-CA" dirty="0">
-                <a:solidFill>
-                  <a:srgbClr val="D11C24"/>
-                </a:solidFill>
-                <a:latin typeface="Consolas" panose="020B0609020204030204" pitchFamily="49" charset="0"/>
-              </a:rPr>
-              <a:t>NULL</a:t>
-            </a:r>
-            <a:r>
-              <a:rPr lang="fr-CA" dirty="0">
-                <a:solidFill>
-                  <a:srgbClr val="859900"/>
-                </a:solidFill>
-                <a:latin typeface="Consolas" panose="020B0609020204030204" pitchFamily="49" charset="0"/>
-              </a:rPr>
-              <a:t>)</a:t>
-            </a:r>
-            <a:r>
-              <a:rPr lang="fr-CA" dirty="0">
-                <a:solidFill>
-                  <a:srgbClr val="819090"/>
-                </a:solidFill>
-                <a:latin typeface="Consolas" panose="020B0609020204030204" pitchFamily="49" charset="0"/>
-              </a:rPr>
-              <a:t> </a:t>
-            </a:r>
-          </a:p>
-          <a:p>
-            <a:r>
-              <a:rPr lang="fr-CA" dirty="0">
-                <a:solidFill>
-                  <a:srgbClr val="859900"/>
-                </a:solidFill>
-                <a:latin typeface="Consolas" panose="020B0609020204030204" pitchFamily="49" charset="0"/>
-              </a:rPr>
-              <a:t>{</a:t>
-            </a:r>
-            <a:r>
-              <a:rPr lang="fr-CA" dirty="0">
-                <a:solidFill>
-                  <a:srgbClr val="819090"/>
-                </a:solidFill>
-                <a:latin typeface="Consolas" panose="020B0609020204030204" pitchFamily="49" charset="0"/>
-              </a:rPr>
-              <a:t> </a:t>
-            </a:r>
-          </a:p>
-          <a:p>
-            <a:r>
-              <a:rPr lang="fr-CA" dirty="0">
-                <a:solidFill>
-                  <a:srgbClr val="819090"/>
-                </a:solidFill>
-                <a:latin typeface="Consolas" panose="020B0609020204030204" pitchFamily="49" charset="0"/>
-              </a:rPr>
-              <a:t>	</a:t>
-            </a:r>
-            <a:r>
-              <a:rPr lang="fr-CA" dirty="0" err="1">
-                <a:solidFill>
-                  <a:srgbClr val="D11C24"/>
-                </a:solidFill>
-                <a:latin typeface="Consolas" panose="020B0609020204030204" pitchFamily="49" charset="0"/>
-              </a:rPr>
-              <a:t>delete</a:t>
-            </a:r>
-            <a:r>
-              <a:rPr lang="fr-CA" dirty="0">
-                <a:solidFill>
-                  <a:srgbClr val="819090"/>
-                </a:solidFill>
-                <a:latin typeface="Consolas" panose="020B0609020204030204" pitchFamily="49" charset="0"/>
-              </a:rPr>
-              <a:t> plat2</a:t>
-            </a:r>
-            <a:r>
-              <a:rPr lang="fr-CA" dirty="0">
-                <a:solidFill>
-                  <a:srgbClr val="859900"/>
-                </a:solidFill>
-                <a:latin typeface="Consolas" panose="020B0609020204030204" pitchFamily="49" charset="0"/>
-              </a:rPr>
-              <a:t>;</a:t>
-            </a:r>
-            <a:r>
-              <a:rPr lang="fr-CA" dirty="0">
-                <a:solidFill>
-                  <a:srgbClr val="819090"/>
-                </a:solidFill>
-                <a:latin typeface="Consolas" panose="020B0609020204030204" pitchFamily="49" charset="0"/>
-              </a:rPr>
-              <a:t> </a:t>
-            </a:r>
-          </a:p>
-          <a:p>
-            <a:r>
-              <a:rPr lang="fr-CA" dirty="0">
-                <a:solidFill>
-                  <a:srgbClr val="859900"/>
-                </a:solidFill>
-                <a:latin typeface="Consolas" panose="020B0609020204030204" pitchFamily="49" charset="0"/>
-              </a:rPr>
-              <a:t>}</a:t>
             </a:r>
             <a:endParaRPr lang="fr-CA" dirty="0"/>
           </a:p>
@@ -45837,7 +45759,7 @@
             <a:pPr algn="ctr"/>
             <a:r>
               <a:rPr lang="fr-CA" dirty="0"/>
-              <a:t>Méthodes: chauffage, décongélation, etc.</a:t>
+              <a:t>Méthodes: chauffer, décongeler, etc.</a:t>
             </a:r>
           </a:p>
           <a:p>

</xml_diff>